<commit_message>
Enable 'social_network.py' to output the simulation data summary
</commit_message>
<xml_diff>
--- a/report/ToMNET.pptx
+++ b/report/ToMNET.pptx
@@ -17291,7 +17291,7 @@
           <a:p>
             <a:fld id="{C34CE1C7-AB57-4E47-B0F5-E8BB4CB6614A}" type="datetimeFigureOut">
               <a:rPr kumimoji="1" lang="zh-TW" altLang="en-US" smtClean="0"/>
-              <a:t>2019/7/8</a:t>
+              <a:t>2019/7/31</a:t>
             </a:fld>
             <a:endParaRPr kumimoji="1" lang="zh-TW" altLang="en-US"/>
           </a:p>
@@ -19221,7 +19221,7 @@
           <a:p>
             <a:fld id="{73F99C50-D6BB-DD44-98D6-7975662BA23B}" type="datetimeFigureOut">
               <a:rPr kumimoji="1" lang="zh-TW" altLang="en-US" smtClean="0"/>
-              <a:t>2019/7/8</a:t>
+              <a:t>2019/7/31</a:t>
             </a:fld>
             <a:endParaRPr kumimoji="1" lang="zh-TW" altLang="en-US"/>
           </a:p>
@@ -19394,7 +19394,7 @@
           <a:p>
             <a:fld id="{73F99C50-D6BB-DD44-98D6-7975662BA23B}" type="datetimeFigureOut">
               <a:rPr kumimoji="1" lang="zh-TW" altLang="en-US" smtClean="0"/>
-              <a:t>2019/7/8</a:t>
+              <a:t>2019/7/31</a:t>
             </a:fld>
             <a:endParaRPr kumimoji="1" lang="zh-TW" altLang="en-US"/>
           </a:p>
@@ -19577,7 +19577,7 @@
           <a:p>
             <a:fld id="{73F99C50-D6BB-DD44-98D6-7975662BA23B}" type="datetimeFigureOut">
               <a:rPr kumimoji="1" lang="zh-TW" altLang="en-US" smtClean="0"/>
-              <a:t>2019/7/8</a:t>
+              <a:t>2019/7/31</a:t>
             </a:fld>
             <a:endParaRPr kumimoji="1" lang="zh-TW" altLang="en-US"/>
           </a:p>
@@ -19750,7 +19750,7 @@
           <a:p>
             <a:fld id="{73F99C50-D6BB-DD44-98D6-7975662BA23B}" type="datetimeFigureOut">
               <a:rPr kumimoji="1" lang="zh-TW" altLang="en-US" smtClean="0"/>
-              <a:t>2019/7/8</a:t>
+              <a:t>2019/7/31</a:t>
             </a:fld>
             <a:endParaRPr kumimoji="1" lang="zh-TW" altLang="en-US"/>
           </a:p>
@@ -20028,7 +20028,7 @@
           <a:p>
             <a:fld id="{73F99C50-D6BB-DD44-98D6-7975662BA23B}" type="datetimeFigureOut">
               <a:rPr kumimoji="1" lang="zh-TW" altLang="en-US" smtClean="0"/>
-              <a:t>2019/7/8</a:t>
+              <a:t>2019/7/31</a:t>
             </a:fld>
             <a:endParaRPr kumimoji="1" lang="zh-TW" altLang="en-US"/>
           </a:p>
@@ -20243,7 +20243,7 @@
           <a:p>
             <a:fld id="{73F99C50-D6BB-DD44-98D6-7975662BA23B}" type="datetimeFigureOut">
               <a:rPr kumimoji="1" lang="zh-TW" altLang="en-US" smtClean="0"/>
-              <a:t>2019/7/8</a:t>
+              <a:t>2019/7/31</a:t>
             </a:fld>
             <a:endParaRPr kumimoji="1" lang="zh-TW" altLang="en-US"/>
           </a:p>
@@ -20611,7 +20611,7 @@
           <a:p>
             <a:fld id="{73F99C50-D6BB-DD44-98D6-7975662BA23B}" type="datetimeFigureOut">
               <a:rPr kumimoji="1" lang="zh-TW" altLang="en-US" smtClean="0"/>
-              <a:t>2019/7/8</a:t>
+              <a:t>2019/7/31</a:t>
             </a:fld>
             <a:endParaRPr kumimoji="1" lang="zh-TW" altLang="en-US"/>
           </a:p>
@@ -20752,7 +20752,7 @@
           <a:p>
             <a:fld id="{73F99C50-D6BB-DD44-98D6-7975662BA23B}" type="datetimeFigureOut">
               <a:rPr kumimoji="1" lang="zh-TW" altLang="en-US" smtClean="0"/>
-              <a:t>2019/7/8</a:t>
+              <a:t>2019/7/31</a:t>
             </a:fld>
             <a:endParaRPr kumimoji="1" lang="zh-TW" altLang="en-US"/>
           </a:p>
@@ -20865,7 +20865,7 @@
           <a:p>
             <a:fld id="{73F99C50-D6BB-DD44-98D6-7975662BA23B}" type="datetimeFigureOut">
               <a:rPr kumimoji="1" lang="zh-TW" altLang="en-US" smtClean="0"/>
-              <a:t>2019/7/8</a:t>
+              <a:t>2019/7/31</a:t>
             </a:fld>
             <a:endParaRPr kumimoji="1" lang="zh-TW" altLang="en-US"/>
           </a:p>
@@ -21154,7 +21154,7 @@
           <a:p>
             <a:fld id="{73F99C50-D6BB-DD44-98D6-7975662BA23B}" type="datetimeFigureOut">
               <a:rPr kumimoji="1" lang="zh-TW" altLang="en-US" smtClean="0"/>
-              <a:t>2019/7/8</a:t>
+              <a:t>2019/7/31</a:t>
             </a:fld>
             <a:endParaRPr kumimoji="1" lang="zh-TW" altLang="en-US"/>
           </a:p>
@@ -21445,7 +21445,7 @@
           <a:p>
             <a:fld id="{73F99C50-D6BB-DD44-98D6-7975662BA23B}" type="datetimeFigureOut">
               <a:rPr kumimoji="1" lang="zh-TW" altLang="en-US" smtClean="0"/>
-              <a:t>2019/7/8</a:t>
+              <a:t>2019/7/31</a:t>
             </a:fld>
             <a:endParaRPr kumimoji="1" lang="zh-TW" altLang="en-US"/>
           </a:p>
@@ -21661,7 +21661,7 @@
           <a:p>
             <a:fld id="{73F99C50-D6BB-DD44-98D6-7975662BA23B}" type="datetimeFigureOut">
               <a:rPr kumimoji="1" lang="zh-TW" altLang="en-US" smtClean="0"/>
-              <a:t>2019/7/8</a:t>
+              <a:t>2019/7/31</a:t>
             </a:fld>
             <a:endParaRPr kumimoji="1" lang="zh-TW" altLang="en-US"/>
           </a:p>
@@ -28853,7 +28853,7 @@
           <p:nvPr>
             <p:extLst>
               <p:ext uri="{D42A27DB-BD31-4B8C-83A1-F6EECF244321}">
-                <p14:modId xmlns:p14="http://schemas.microsoft.com/office/powerpoint/2010/main" val="2586771886"/>
+                <p14:modId xmlns:p14="http://schemas.microsoft.com/office/powerpoint/2010/main" val="1999698774"/>
               </p:ext>
             </p:extLst>
           </p:nvPr>
@@ -29499,7 +29499,14 @@
                           <a:latin typeface="Times New Roman" panose="02020603050405020304" pitchFamily="18" charset="0"/>
                           <a:cs typeface="Times New Roman" panose="02020603050405020304" pitchFamily="18" charset="0"/>
                         </a:rPr>
-                        <a:t>D &gt; C &gt; A &gt; B</a:t>
+                        <a:t>D &gt; C </a:t>
+                      </a:r>
+                      <a:r>
+                        <a:rPr lang="en-US" altLang="zh-TW" sz="2800">
+                          <a:latin typeface="Times New Roman" panose="02020603050405020304" pitchFamily="18" charset="0"/>
+                          <a:cs typeface="Times New Roman" panose="02020603050405020304" pitchFamily="18" charset="0"/>
+                        </a:rPr>
+                        <a:t>&gt;  A &gt; B</a:t>
                       </a:r>
                       <a:endParaRPr lang="zh-TW" altLang="en-US" sz="2800" dirty="0">
                         <a:latin typeface="Times New Roman" panose="02020603050405020304" pitchFamily="18" charset="0"/>

</xml_diff>